<commit_message>
Modified material for ICR students
</commit_message>
<xml_diff>
--- a/Intro to Latex Slides.pptx
+++ b/Intro to Latex Slides.pptx
@@ -5,10 +5,10 @@
     <p:sldMasterId id="2147483648" r:id="rId1"/>
   </p:sldMasterIdLst>
   <p:notesMasterIdLst>
-    <p:notesMasterId r:id="rId26"/>
+    <p:notesMasterId r:id="rId24"/>
   </p:notesMasterIdLst>
   <p:handoutMasterIdLst>
-    <p:handoutMasterId r:id="rId27"/>
+    <p:handoutMasterId r:id="rId25"/>
   </p:handoutMasterIdLst>
   <p:sldIdLst>
     <p:sldId id="264" r:id="rId2"/>
@@ -31,10 +31,8 @@
     <p:sldId id="321" r:id="rId19"/>
     <p:sldId id="322" r:id="rId20"/>
     <p:sldId id="290" r:id="rId21"/>
-    <p:sldId id="328" r:id="rId22"/>
-    <p:sldId id="291" r:id="rId23"/>
-    <p:sldId id="329" r:id="rId24"/>
-    <p:sldId id="280" r:id="rId25"/>
+    <p:sldId id="291" r:id="rId22"/>
+    <p:sldId id="280" r:id="rId23"/>
   </p:sldIdLst>
   <p:sldSz cx="9144000" cy="6858000" type="screen4x3"/>
   <p:notesSz cx="7099300" cy="10234613"/>
@@ -158,9 +156,7 @@
             <p14:sldId id="321"/>
             <p14:sldId id="322"/>
             <p14:sldId id="290"/>
-            <p14:sldId id="328"/>
             <p14:sldId id="291"/>
-            <p14:sldId id="329"/>
             <p14:sldId id="280"/>
           </p14:sldIdLst>
         </p14:section>
@@ -436,7 +432,7 @@
           <a:p>
             <a:fld id="{88EB714B-C3CC-4216-88C1-02913905B1CF}" type="datetimeFigureOut">
               <a:rPr lang="en-GB" smtClean="0"/>
-              <a:t>19/02/2021</a:t>
+              <a:t>24/02/2021</a:t>
             </a:fld>
             <a:endParaRPr lang="en-GB"/>
           </a:p>
@@ -2689,23 +2685,41 @@
           <a:p>
             <a:r>
               <a:rPr lang="en-GB" dirty="0"/>
-              <a:t>If you want to do something in LaTeX but don’t know how, the first thing to do is to Google it. Somebody has almost certainly had your problem/desire before and you can copy their solution most of the time. On many occasions, you’ll find the answer of </a:t>
+              <a:t>If you’re working on a document to submit to a journal, there are a number of things to bear in mind. Many journals have custom </a:t>
             </a:r>
             <a:r>
               <a:rPr lang="en-GB" dirty="0" err="1"/>
-              <a:t>stackexchange</a:t>
-            </a:r>
-            <a:r>
-              <a:rPr lang="en-GB" dirty="0"/>
-              <a:t>. As well as being a useful environment to develop and run LaTeX, Overleaf has an extensive library of documentation on LaTeX’s functions. There’s also a very good </a:t>
+              <a:t>documentclasses</a:t>
+            </a:r>
+            <a:r>
+              <a:rPr lang="en-GB" dirty="0"/>
+              <a:t> which they make available and you can chose to use when submitting. Some journals might require you to use their </a:t>
             </a:r>
             <a:r>
               <a:rPr lang="en-GB" dirty="0" err="1"/>
-              <a:t>wikibook</a:t>
-            </a:r>
-            <a:r>
-              <a:rPr lang="en-GB" dirty="0"/>
-              <a:t> that contains a good description of the functionality of LaTeX. There’s also a good table maker which allows you to define tables in a more natural and graphical way and have it return the equivalent LaTeX code. Finally, there’s an equation editor which allows you to define equations in a more graphical fashion and have it return the equivalent LaTeX code.</a:t>
+              <a:t>documentclass</a:t>
+            </a:r>
+            <a:r>
+              <a:rPr lang="en-GB" dirty="0"/>
+              <a:t> when submitting.</a:t>
+            </a:r>
+            <a:br>
+              <a:rPr lang="en-GB" dirty="0"/>
+            </a:br>
+            <a:br>
+              <a:rPr lang="en-GB" dirty="0"/>
+            </a:br>
+            <a:r>
+              <a:rPr lang="en-GB" dirty="0"/>
+              <a:t>In many cases you can submit your LaTeX source files to the journal as well. This aids the typesetters at the journal in working on your document. For many journals, </a:t>
+            </a:r>
+            <a:r>
+              <a:rPr lang="en-GB" dirty="0" err="1"/>
+              <a:t>typsetters</a:t>
+            </a:r>
+            <a:r>
+              <a:rPr lang="en-GB" dirty="0"/>
+              <a:t> will alter your script substantially to make sure it fits the standards and style of the journal. This means that you don’t need to make your document look perfect when you submit it. You need it to be easily legible for the reviewers and editors to read, but spending days tweaking fine details might not be a good use of your time. Check the process and requirements of the journal you’re submitting to so you fulfil all their requirements but don’t put in effort that will ultimately be wasted.</a:t>
             </a:r>
           </a:p>
         </p:txBody>
@@ -2736,7 +2750,7 @@
     </p:spTree>
     <p:extLst>
       <p:ext uri="{BB962C8B-B14F-4D97-AF65-F5344CB8AC3E}">
-        <p14:creationId xmlns:p14="http://schemas.microsoft.com/office/powerpoint/2010/main" val="1445805806"/>
+        <p14:creationId xmlns:p14="http://schemas.microsoft.com/office/powerpoint/2010/main" val="3430040987"/>
       </p:ext>
     </p:extLst>
   </p:cSld>
@@ -2765,211 +2779,6 @@
       </p:grpSpPr>
       <p:sp>
         <p:nvSpPr>
-          <p:cNvPr id="2" name="Slide Image Placeholder 1"/>
-          <p:cNvSpPr>
-            <a:spLocks noGrp="1" noRot="1" noChangeAspect="1"/>
-          </p:cNvSpPr>
-          <p:nvPr>
-            <p:ph type="sldImg"/>
-          </p:nvPr>
-        </p:nvSpPr>
-        <p:spPr/>
-      </p:sp>
-      <p:sp>
-        <p:nvSpPr>
-          <p:cNvPr id="3" name="Notes Placeholder 2"/>
-          <p:cNvSpPr>
-            <a:spLocks noGrp="1"/>
-          </p:cNvSpPr>
-          <p:nvPr>
-            <p:ph type="body" idx="1"/>
-          </p:nvPr>
-        </p:nvSpPr>
-        <p:spPr/>
-        <p:txBody>
-          <a:bodyPr/>
-          <a:lstStyle/>
-          <a:p>
-            <a:r>
-              <a:rPr lang="en-GB" dirty="0"/>
-              <a:t>If you’re working on a document to submit to a journal, there are a number of things to bear in mind. Many journals have custom </a:t>
-            </a:r>
-            <a:r>
-              <a:rPr lang="en-GB" dirty="0" err="1"/>
-              <a:t>documentclasses</a:t>
-            </a:r>
-            <a:r>
-              <a:rPr lang="en-GB" dirty="0"/>
-              <a:t> which they make available and you can chose to use when submitting. Some journals might require you to use their </a:t>
-            </a:r>
-            <a:r>
-              <a:rPr lang="en-GB" dirty="0" err="1"/>
-              <a:t>documentclass</a:t>
-            </a:r>
-            <a:r>
-              <a:rPr lang="en-GB" dirty="0"/>
-              <a:t> when submitting.</a:t>
-            </a:r>
-            <a:br>
-              <a:rPr lang="en-GB" dirty="0"/>
-            </a:br>
-            <a:br>
-              <a:rPr lang="en-GB" dirty="0"/>
-            </a:br>
-            <a:r>
-              <a:rPr lang="en-GB" dirty="0"/>
-              <a:t>In many cases you can submit your LaTeX source files to the journal as well. This aids the typesetters at the journal in working on your document. For many journals, </a:t>
-            </a:r>
-            <a:r>
-              <a:rPr lang="en-GB" dirty="0" err="1"/>
-              <a:t>typsetters</a:t>
-            </a:r>
-            <a:r>
-              <a:rPr lang="en-GB" dirty="0"/>
-              <a:t> will alter your script substantially to make sure it fits the standards and style of the journal. This means that you don’t need to make your document look perfect when you submit it. You need it to be easily legible for the reviewers and editors to read, but spending days tweaking fine details might not be a good use of your time. Check the process and requirements of the journal you’re submitting to so you fulfil all their requirements but don’t put in effort that will ultimately be wasted.</a:t>
-            </a:r>
-          </a:p>
-        </p:txBody>
-      </p:sp>
-      <p:sp>
-        <p:nvSpPr>
-          <p:cNvPr id="4" name="Slide Number Placeholder 3"/>
-          <p:cNvSpPr>
-            <a:spLocks noGrp="1"/>
-          </p:cNvSpPr>
-          <p:nvPr>
-            <p:ph type="sldNum" sz="quarter" idx="10"/>
-          </p:nvPr>
-        </p:nvSpPr>
-        <p:spPr/>
-        <p:txBody>
-          <a:bodyPr/>
-          <a:lstStyle/>
-          <a:p>
-            <a:fld id="{6A641EC8-C9F8-4A58-A1A7-F7D817526EEC}" type="slidenum">
-              <a:rPr lang="en-GB" smtClean="0"/>
-              <a:t>22</a:t>
-            </a:fld>
-            <a:endParaRPr lang="en-GB"/>
-          </a:p>
-        </p:txBody>
-      </p:sp>
-    </p:spTree>
-    <p:extLst>
-      <p:ext uri="{BB962C8B-B14F-4D97-AF65-F5344CB8AC3E}">
-        <p14:creationId xmlns:p14="http://schemas.microsoft.com/office/powerpoint/2010/main" val="3430040987"/>
-      </p:ext>
-    </p:extLst>
-  </p:cSld>
-  <p:clrMapOvr>
-    <a:masterClrMapping/>
-  </p:clrMapOvr>
-</p:notes>
-</file>
-
-<file path=ppt/notesSlides/notesSlide23.xml><?xml version="1.0" encoding="utf-8"?>
-<p:notes xmlns:a="http://schemas.openxmlformats.org/drawingml/2006/main" xmlns:r="http://schemas.openxmlformats.org/officeDocument/2006/relationships" xmlns:p="http://schemas.openxmlformats.org/presentationml/2006/main">
-  <p:cSld>
-    <p:spTree>
-      <p:nvGrpSpPr>
-        <p:cNvPr id="1" name=""/>
-        <p:cNvGrpSpPr/>
-        <p:nvPr/>
-      </p:nvGrpSpPr>
-      <p:grpSpPr>
-        <a:xfrm>
-          <a:off x="0" y="0"/>
-          <a:ext cx="0" cy="0"/>
-          <a:chOff x="0" y="0"/>
-          <a:chExt cx="0" cy="0"/>
-        </a:xfrm>
-      </p:grpSpPr>
-      <p:sp>
-        <p:nvSpPr>
-          <p:cNvPr id="2" name="Slide Image Placeholder 1"/>
-          <p:cNvSpPr>
-            <a:spLocks noGrp="1" noRot="1" noChangeAspect="1"/>
-          </p:cNvSpPr>
-          <p:nvPr>
-            <p:ph type="sldImg"/>
-          </p:nvPr>
-        </p:nvSpPr>
-        <p:spPr/>
-      </p:sp>
-      <p:sp>
-        <p:nvSpPr>
-          <p:cNvPr id="3" name="Notes Placeholder 2"/>
-          <p:cNvSpPr>
-            <a:spLocks noGrp="1"/>
-          </p:cNvSpPr>
-          <p:nvPr>
-            <p:ph type="body" idx="1"/>
-          </p:nvPr>
-        </p:nvSpPr>
-        <p:spPr/>
-        <p:txBody>
-          <a:bodyPr/>
-          <a:lstStyle/>
-          <a:p>
-            <a:endParaRPr lang="en-GB" dirty="0"/>
-          </a:p>
-        </p:txBody>
-      </p:sp>
-      <p:sp>
-        <p:nvSpPr>
-          <p:cNvPr id="4" name="Slide Number Placeholder 3"/>
-          <p:cNvSpPr>
-            <a:spLocks noGrp="1"/>
-          </p:cNvSpPr>
-          <p:nvPr>
-            <p:ph type="sldNum" sz="quarter" idx="10"/>
-          </p:nvPr>
-        </p:nvSpPr>
-        <p:spPr/>
-        <p:txBody>
-          <a:bodyPr/>
-          <a:lstStyle/>
-          <a:p>
-            <a:fld id="{6A641EC8-C9F8-4A58-A1A7-F7D817526EEC}" type="slidenum">
-              <a:rPr lang="en-GB" smtClean="0"/>
-              <a:t>23</a:t>
-            </a:fld>
-            <a:endParaRPr lang="en-GB"/>
-          </a:p>
-        </p:txBody>
-      </p:sp>
-    </p:spTree>
-    <p:extLst>
-      <p:ext uri="{BB962C8B-B14F-4D97-AF65-F5344CB8AC3E}">
-        <p14:creationId xmlns:p14="http://schemas.microsoft.com/office/powerpoint/2010/main" val="1492413823"/>
-      </p:ext>
-    </p:extLst>
-  </p:cSld>
-  <p:clrMapOvr>
-    <a:masterClrMapping/>
-  </p:clrMapOvr>
-</p:notes>
-</file>
-
-<file path=ppt/notesSlides/notesSlide24.xml><?xml version="1.0" encoding="utf-8"?>
-<p:notes xmlns:a="http://schemas.openxmlformats.org/drawingml/2006/main" xmlns:r="http://schemas.openxmlformats.org/officeDocument/2006/relationships" xmlns:p="http://schemas.openxmlformats.org/presentationml/2006/main">
-  <p:cSld>
-    <p:spTree>
-      <p:nvGrpSpPr>
-        <p:cNvPr id="1" name=""/>
-        <p:cNvGrpSpPr/>
-        <p:nvPr/>
-      </p:nvGrpSpPr>
-      <p:grpSpPr>
-        <a:xfrm>
-          <a:off x="0" y="0"/>
-          <a:ext cx="0" cy="0"/>
-          <a:chOff x="0" y="0"/>
-          <a:chExt cx="0" cy="0"/>
-        </a:xfrm>
-      </p:grpSpPr>
-      <p:sp>
-        <p:nvSpPr>
           <p:cNvPr id="108546" name="Rectangle 7"/>
           <p:cNvSpPr>
             <a:spLocks noGrp="1" noChangeArrowheads="1"/>
@@ -3128,7 +2937,7 @@
                   <a:spcPct val="0"/>
                 </a:spcBef>
               </a:pPr>
-              <a:t>24</a:t>
+              <a:t>22</a:t>
             </a:fld>
             <a:endParaRPr lang="en-US" altLang="en-US"/>
           </a:p>
@@ -3383,7 +3192,7 @@
           <a:p>
             <a:r>
               <a:rPr lang="en-GB" dirty="0"/>
-              <a:t>Overleaf is the online environment which we’ll be using to create and compile your LaTeX documents. College has a subscription to it so, if you sign up with your college email address, you can get the pro-version. You should have already created an account as indicated in the pre-course instructions.</a:t>
+              <a:t>Overleaf is the online environment which we’ll be using to create and compile your LaTeX documents. You should have already created an account as indicated in the pre-course instructions.</a:t>
             </a:r>
             <a:br>
               <a:rPr lang="en-GB" dirty="0"/>
@@ -3401,15 +3210,7 @@
             </a:r>
             <a:r>
               <a:rPr lang="en-GB" dirty="0"/>
-              <a:t> which can allow you carry on working on your documents offline using an offline editor. Overleaf also has an integrated “review system” which might allow your supervisor or collaborator to review </a:t>
-            </a:r>
-            <a:r>
-              <a:rPr lang="en-GB"/>
-              <a:t>your document </a:t>
-            </a:r>
-            <a:r>
-              <a:rPr lang="en-GB" dirty="0"/>
-              <a:t>in the same place that you’re writing it, saving a lot of flipping between documents.</a:t>
+              <a:t> which can allow you carry on working on your documents offline using an offline editor. Overleaf also has an integrated “review system” which might allow your supervisor or collaborator to review your document in the same place that you’re writing it, saving a lot of flipping between documents.</a:t>
             </a:r>
             <a:br>
               <a:rPr lang="en-GB" dirty="0"/>
@@ -4466,7 +4267,7 @@
           <a:p>
             <a:fld id="{EB0080F8-EA1C-491D-963C-2C881B2F918F}" type="datetimeFigureOut">
               <a:rPr lang="en-GB" smtClean="0"/>
-              <a:t>19/02/2021</a:t>
+              <a:t>24/02/2021</a:t>
             </a:fld>
             <a:endParaRPr lang="en-GB"/>
           </a:p>
@@ -4616,7 +4417,7 @@
           <a:p>
             <a:fld id="{EB0080F8-EA1C-491D-963C-2C881B2F918F}" type="datetimeFigureOut">
               <a:rPr lang="en-GB" smtClean="0"/>
-              <a:t>19/02/2021</a:t>
+              <a:t>24/02/2021</a:t>
             </a:fld>
             <a:endParaRPr lang="en-GB"/>
           </a:p>
@@ -6149,7 +5950,7 @@
           <a:p>
             <a:fld id="{EB0080F8-EA1C-491D-963C-2C881B2F918F}" type="datetimeFigureOut">
               <a:rPr lang="en-GB" smtClean="0"/>
-              <a:t>19/02/2021</a:t>
+              <a:t>24/02/2021</a:t>
             </a:fld>
             <a:endParaRPr lang="en-GB"/>
           </a:p>
@@ -6624,18 +6425,14 @@
           <a:lstStyle/>
           <a:p>
             <a:r>
-              <a:rPr lang="en-GB"/>
-              <a:t>Chris </a:t>
-            </a:r>
-            <a:r>
-              <a:rPr lang="en-GB" dirty="0"/>
-              <a:t>Cooling</a:t>
+              <a:rPr lang="en-GB" dirty="0"/>
+              <a:t>Chris Cooling</a:t>
             </a:r>
           </a:p>
           <a:p>
             <a:r>
               <a:rPr lang="en-GB" sz="2400" dirty="0"/>
-              <a:t>Graduate School Teaching Fellow</a:t>
+              <a:t>Imperial College London Graduate School Teaching Fellow</a:t>
             </a:r>
           </a:p>
           <a:p>
@@ -11550,228 +11347,6 @@
           <a:p>
             <a:r>
               <a:rPr lang="en-GB" sz="4000" dirty="0"/>
-              <a:t>Online Tools</a:t>
-            </a:r>
-          </a:p>
-        </p:txBody>
-      </p:sp>
-      <p:pic>
-        <p:nvPicPr>
-          <p:cNvPr id="5" name="Picture 4">
-            <a:extLst>
-              <a:ext uri="{FF2B5EF4-FFF2-40B4-BE49-F238E27FC236}">
-                <a16:creationId xmlns:a16="http://schemas.microsoft.com/office/drawing/2014/main" id="{7024B7B7-0AE3-46F6-B545-576352E8C718}"/>
-              </a:ext>
-            </a:extLst>
-          </p:cNvPr>
-          <p:cNvPicPr>
-            <a:picLocks noChangeAspect="1"/>
-          </p:cNvPicPr>
-          <p:nvPr/>
-        </p:nvPicPr>
-        <p:blipFill>
-          <a:blip r:embed="rId3">
-            <a:extLst>
-              <a:ext uri="{837473B0-CC2E-450A-ABE3-18F120FF3D39}">
-                <a1611:picAttrSrcUrl xmlns:a1611="http://schemas.microsoft.com/office/drawing/2016/11/main" r:id="rId4"/>
-              </a:ext>
-            </a:extLst>
-          </a:blip>
-          <a:stretch>
-            <a:fillRect/>
-          </a:stretch>
-        </p:blipFill>
-        <p:spPr>
-          <a:xfrm>
-            <a:off x="4895582" y="2233493"/>
-            <a:ext cx="4248418" cy="4624507"/>
-          </a:xfrm>
-          <a:prstGeom prst="rect">
-            <a:avLst/>
-          </a:prstGeom>
-        </p:spPr>
-      </p:pic>
-      <p:sp>
-        <p:nvSpPr>
-          <p:cNvPr id="6" name="TextBox 5">
-            <a:extLst>
-              <a:ext uri="{FF2B5EF4-FFF2-40B4-BE49-F238E27FC236}">
-                <a16:creationId xmlns:a16="http://schemas.microsoft.com/office/drawing/2014/main" id="{AECABD07-43E4-4B9D-9B24-AB9E83B2215F}"/>
-              </a:ext>
-            </a:extLst>
-          </p:cNvPr>
-          <p:cNvSpPr txBox="1"/>
-          <p:nvPr/>
-        </p:nvSpPr>
-        <p:spPr>
-          <a:xfrm>
-            <a:off x="457200" y="1957138"/>
-            <a:ext cx="3422732" cy="4247317"/>
-          </a:xfrm>
-          <a:prstGeom prst="rect">
-            <a:avLst/>
-          </a:prstGeom>
-          <a:noFill/>
-        </p:spPr>
-        <p:txBody>
-          <a:bodyPr wrap="none" rtlCol="0">
-            <a:spAutoFit/>
-          </a:bodyPr>
-          <a:lstStyle/>
-          <a:p>
-            <a:pPr marL="457200" indent="-457200">
-              <a:buFont typeface="Arial" panose="020B0604020202020204" pitchFamily="34" charset="0"/>
-              <a:buChar char="•"/>
-            </a:pPr>
-            <a:r>
-              <a:rPr lang="en-GB" sz="3000" dirty="0">
-                <a:hlinkClick r:id="rId5"/>
-              </a:rPr>
-              <a:t>Google</a:t>
-            </a:r>
-            <a:endParaRPr lang="en-GB" sz="3000" dirty="0"/>
-          </a:p>
-          <a:p>
-            <a:pPr marL="457200" indent="-457200">
-              <a:buFont typeface="Arial" panose="020B0604020202020204" pitchFamily="34" charset="0"/>
-              <a:buChar char="•"/>
-            </a:pPr>
-            <a:r>
-              <a:rPr lang="en-GB" sz="3000" dirty="0">
-                <a:hlinkClick r:id="rId6"/>
-              </a:rPr>
-              <a:t>Stack Exchange</a:t>
-            </a:r>
-            <a:endParaRPr lang="en-GB" sz="3000" dirty="0"/>
-          </a:p>
-          <a:p>
-            <a:pPr marL="457200" indent="-457200">
-              <a:buFont typeface="Arial" panose="020B0604020202020204" pitchFamily="34" charset="0"/>
-              <a:buChar char="•"/>
-            </a:pPr>
-            <a:r>
-              <a:rPr lang="en-GB" sz="3000" dirty="0">
-                <a:hlinkClick r:id="rId7"/>
-              </a:rPr>
-              <a:t>Overleaf</a:t>
-            </a:r>
-            <a:endParaRPr lang="en-GB" sz="3000" dirty="0"/>
-          </a:p>
-          <a:p>
-            <a:pPr marL="457200" indent="-457200">
-              <a:buFont typeface="Arial" panose="020B0604020202020204" pitchFamily="34" charset="0"/>
-              <a:buChar char="•"/>
-            </a:pPr>
-            <a:r>
-              <a:rPr lang="en-GB" sz="3000" dirty="0" err="1">
-                <a:hlinkClick r:id="rId8"/>
-              </a:rPr>
-              <a:t>Wikibook</a:t>
-            </a:r>
-            <a:endParaRPr lang="en-GB" sz="3000" dirty="0"/>
-          </a:p>
-          <a:p>
-            <a:pPr marL="457200" indent="-457200">
-              <a:buFont typeface="Arial" panose="020B0604020202020204" pitchFamily="34" charset="0"/>
-              <a:buChar char="•"/>
-            </a:pPr>
-            <a:r>
-              <a:rPr lang="en-GB" sz="3000" dirty="0">
-                <a:hlinkClick r:id="rId9"/>
-              </a:rPr>
-              <a:t>Table Maker</a:t>
-            </a:r>
-            <a:endParaRPr lang="en-GB" sz="3000" dirty="0"/>
-          </a:p>
-          <a:p>
-            <a:pPr marL="457200" indent="-457200">
-              <a:buFont typeface="Arial" panose="020B0604020202020204" pitchFamily="34" charset="0"/>
-              <a:buChar char="•"/>
-            </a:pPr>
-            <a:r>
-              <a:rPr lang="en-GB" sz="3000" dirty="0">
-                <a:hlinkClick r:id="rId10"/>
-              </a:rPr>
-              <a:t>Equation Editor</a:t>
-            </a:r>
-            <a:endParaRPr lang="en-GB" sz="3000" dirty="0"/>
-          </a:p>
-          <a:p>
-            <a:pPr marL="457200" indent="-457200">
-              <a:buFont typeface="Arial" panose="020B0604020202020204" pitchFamily="34" charset="0"/>
-              <a:buChar char="•"/>
-            </a:pPr>
-            <a:r>
-              <a:rPr lang="en-GB" sz="3000" dirty="0">
-                <a:hlinkClick r:id="rId11"/>
-              </a:rPr>
-              <a:t>Detexify</a:t>
-            </a:r>
-            <a:endParaRPr lang="en-GB" sz="3000" dirty="0"/>
-          </a:p>
-          <a:p>
-            <a:endParaRPr lang="en-GB" sz="3000" dirty="0"/>
-          </a:p>
-          <a:p>
-            <a:endParaRPr lang="en-GB" sz="3000" dirty="0"/>
-          </a:p>
-        </p:txBody>
-      </p:sp>
-    </p:spTree>
-    <p:extLst>
-      <p:ext uri="{BB962C8B-B14F-4D97-AF65-F5344CB8AC3E}">
-        <p14:creationId xmlns:p14="http://schemas.microsoft.com/office/powerpoint/2010/main" val="1331705178"/>
-      </p:ext>
-    </p:extLst>
-  </p:cSld>
-  <p:clrMapOvr>
-    <a:masterClrMapping/>
-  </p:clrMapOvr>
-  <mc:AlternateContent xmlns:mc="http://schemas.openxmlformats.org/markup-compatibility/2006" xmlns:p14="http://schemas.microsoft.com/office/powerpoint/2010/main">
-    <mc:Choice Requires="p14">
-      <p:transition p14:dur="10"/>
-    </mc:Choice>
-    <mc:Fallback xmlns="">
-      <p:transition/>
-    </mc:Fallback>
-  </mc:AlternateContent>
-</p:sld>
-</file>
-
-<file path=ppt/slides/slide22.xml><?xml version="1.0" encoding="utf-8"?>
-<p:sld xmlns:a="http://schemas.openxmlformats.org/drawingml/2006/main" xmlns:r="http://schemas.openxmlformats.org/officeDocument/2006/relationships" xmlns:p="http://schemas.openxmlformats.org/presentationml/2006/main">
-  <p:cSld>
-    <p:spTree>
-      <p:nvGrpSpPr>
-        <p:cNvPr id="1" name=""/>
-        <p:cNvGrpSpPr/>
-        <p:nvPr/>
-      </p:nvGrpSpPr>
-      <p:grpSpPr>
-        <a:xfrm>
-          <a:off x="0" y="0"/>
-          <a:ext cx="0" cy="0"/>
-          <a:chOff x="0" y="0"/>
-          <a:chExt cx="0" cy="0"/>
-        </a:xfrm>
-      </p:grpSpPr>
-      <p:sp>
-        <p:nvSpPr>
-          <p:cNvPr id="2" name="Title 1"/>
-          <p:cNvSpPr>
-            <a:spLocks noGrp="1"/>
-          </p:cNvSpPr>
-          <p:nvPr>
-            <p:ph type="title"/>
-          </p:nvPr>
-        </p:nvSpPr>
-        <p:spPr/>
-        <p:txBody>
-          <a:bodyPr/>
-          <a:lstStyle/>
-          <a:p>
-            <a:r>
-              <a:rPr lang="en-GB" sz="4000" dirty="0"/>
               <a:t>Journal Submission</a:t>
             </a:r>
           </a:p>
@@ -11862,131 +11437,7 @@
 </p:sld>
 </file>
 
-<file path=ppt/slides/slide23.xml><?xml version="1.0" encoding="utf-8"?>
-<p:sld xmlns:a="http://schemas.openxmlformats.org/drawingml/2006/main" xmlns:r="http://schemas.openxmlformats.org/officeDocument/2006/relationships" xmlns:p="http://schemas.openxmlformats.org/presentationml/2006/main">
-  <p:cSld>
-    <p:spTree>
-      <p:nvGrpSpPr>
-        <p:cNvPr id="1" name=""/>
-        <p:cNvGrpSpPr/>
-        <p:nvPr/>
-      </p:nvGrpSpPr>
-      <p:grpSpPr>
-        <a:xfrm>
-          <a:off x="0" y="0"/>
-          <a:ext cx="0" cy="0"/>
-          <a:chOff x="0" y="0"/>
-          <a:chExt cx="0" cy="0"/>
-        </a:xfrm>
-      </p:grpSpPr>
-      <p:sp>
-        <p:nvSpPr>
-          <p:cNvPr id="2" name="Title 1"/>
-          <p:cNvSpPr>
-            <a:spLocks noGrp="1"/>
-          </p:cNvSpPr>
-          <p:nvPr>
-            <p:ph type="title"/>
-          </p:nvPr>
-        </p:nvSpPr>
-        <p:spPr/>
-        <p:txBody>
-          <a:bodyPr/>
-          <a:lstStyle/>
-          <a:p>
-            <a:r>
-              <a:rPr lang="en-GB" sz="4000" dirty="0"/>
-              <a:t>Feedback</a:t>
-            </a:r>
-          </a:p>
-        </p:txBody>
-      </p:sp>
-      <p:sp>
-        <p:nvSpPr>
-          <p:cNvPr id="3" name="Content Placeholder 2"/>
-          <p:cNvSpPr>
-            <a:spLocks noGrp="1"/>
-          </p:cNvSpPr>
-          <p:nvPr>
-            <p:ph idx="1"/>
-          </p:nvPr>
-        </p:nvSpPr>
-        <p:spPr>
-          <a:xfrm>
-            <a:off x="457200" y="1600200"/>
-            <a:ext cx="8435280" cy="4876800"/>
-          </a:xfrm>
-        </p:spPr>
-        <p:txBody>
-          <a:bodyPr>
-            <a:normAutofit/>
-          </a:bodyPr>
-          <a:lstStyle/>
-          <a:p>
-            <a:r>
-              <a:rPr lang="en-GB" sz="3000" dirty="0"/>
-              <a:t>Once you’ve completed this course, please provide feedback</a:t>
-            </a:r>
-          </a:p>
-          <a:p>
-            <a:pPr lvl="1"/>
-            <a:r>
-              <a:rPr lang="en-GB" sz="2600" dirty="0"/>
-              <a:t>The link is </a:t>
-            </a:r>
-            <a:r>
-              <a:rPr lang="en-GB" sz="2600" b="0" i="0" u="sng" dirty="0">
-                <a:solidFill>
-                  <a:srgbClr val="954F72"/>
-                </a:solidFill>
-                <a:effectLst/>
-                <a:hlinkClick r:id="rId3"/>
-              </a:rPr>
-              <a:t>http://bit.ly/rcds2021</a:t>
-            </a:r>
-            <a:endParaRPr lang="en-GB" sz="2600" dirty="0"/>
-          </a:p>
-          <a:p>
-            <a:pPr lvl="1"/>
-            <a:r>
-              <a:rPr lang="en-GB" sz="2600" dirty="0"/>
-              <a:t>You should also have received an email with this link</a:t>
-            </a:r>
-          </a:p>
-          <a:p>
-            <a:pPr lvl="1"/>
-            <a:r>
-              <a:rPr lang="en-GB" sz="2600" dirty="0"/>
-              <a:t>This helps us improve the class for future students</a:t>
-            </a:r>
-          </a:p>
-          <a:p>
-            <a:endParaRPr lang="en-GB" sz="3000" dirty="0"/>
-          </a:p>
-        </p:txBody>
-      </p:sp>
-    </p:spTree>
-    <p:extLst>
-      <p:ext uri="{BB962C8B-B14F-4D97-AF65-F5344CB8AC3E}">
-        <p14:creationId xmlns:p14="http://schemas.microsoft.com/office/powerpoint/2010/main" val="2122788927"/>
-      </p:ext>
-    </p:extLst>
-  </p:cSld>
-  <p:clrMapOvr>
-    <a:masterClrMapping/>
-  </p:clrMapOvr>
-  <mc:AlternateContent xmlns:mc="http://schemas.openxmlformats.org/markup-compatibility/2006" xmlns:p14="http://schemas.microsoft.com/office/powerpoint/2010/main">
-    <mc:Choice Requires="p14">
-      <p:transition p14:dur="10"/>
-    </mc:Choice>
-    <mc:Fallback xmlns="">
-      <p:transition/>
-    </mc:Fallback>
-  </mc:AlternateContent>
-</p:sld>
-</file>
-
-<file path=ppt/slides/slide24.xml><?xml version="1.0" encoding="utf-8"?>
+<file path=ppt/slides/slide22.xml><?xml version="1.0" encoding="utf-8"?>
 <p:sld xmlns:a="http://schemas.openxmlformats.org/drawingml/2006/main" xmlns:r="http://schemas.openxmlformats.org/officeDocument/2006/relationships" xmlns:p="http://schemas.openxmlformats.org/presentationml/2006/main">
   <p:cSld>
     <p:spTree>
@@ -12451,7 +11902,7 @@
             </a:pPr>
             <a:r>
               <a:rPr lang="en-GB" sz="2400" dirty="0"/>
-              <a:t>Data stored online</a:t>
+              <a:t>Data stored online – implications for patient data</a:t>
             </a:r>
           </a:p>
           <a:p>

</xml_diff>

<commit_message>
Updated equation editor link
</commit_message>
<xml_diff>
--- a/Intro to Latex Slides.pptx
+++ b/Intro to Latex Slides.pptx
@@ -442,7 +442,7 @@
           <a:p>
             <a:fld id="{88EB714B-C3CC-4216-88C1-02913905B1CF}" type="datetimeFigureOut">
               <a:rPr lang="en-GB" smtClean="0"/>
-              <a:t>19/11/2021</a:t>
+              <a:t>13/01/2022</a:t>
             </a:fld>
             <a:endParaRPr lang="en-GB"/>
           </a:p>
@@ -4468,7 +4468,7 @@
           <a:p>
             <a:fld id="{EB0080F8-EA1C-491D-963C-2C881B2F918F}" type="datetimeFigureOut">
               <a:rPr lang="en-GB" smtClean="0"/>
-              <a:t>19/11/2021</a:t>
+              <a:t>13/01/2022</a:t>
             </a:fld>
             <a:endParaRPr lang="en-GB"/>
           </a:p>
@@ -4618,7 +4618,7 @@
           <a:p>
             <a:fld id="{EB0080F8-EA1C-491D-963C-2C881B2F918F}" type="datetimeFigureOut">
               <a:rPr lang="en-GB" smtClean="0"/>
-              <a:t>19/11/2021</a:t>
+              <a:t>13/01/2022</a:t>
             </a:fld>
             <a:endParaRPr lang="en-GB"/>
           </a:p>
@@ -6151,7 +6151,7 @@
           <a:p>
             <a:fld id="{EB0080F8-EA1C-491D-963C-2C881B2F918F}" type="datetimeFigureOut">
               <a:rPr lang="en-GB" smtClean="0"/>
-              <a:t>19/11/2021</a:t>
+              <a:t>13/01/2022</a:t>
             </a:fld>
             <a:endParaRPr lang="en-GB"/>
           </a:p>

</xml_diff>

<commit_message>
Added graphicx usage to figure example
</commit_message>
<xml_diff>
--- a/Intro to Latex Slides.pptx
+++ b/Intro to Latex Slides.pptx
@@ -440,7 +440,7 @@
           <a:p>
             <a:fld id="{88EB714B-C3CC-4216-88C1-02913905B1CF}" type="datetimeFigureOut">
               <a:rPr lang="en-GB" smtClean="0"/>
-              <a:t>08/04/2022</a:t>
+              <a:t>28/04/2022</a:t>
             </a:fld>
             <a:endParaRPr lang="en-GB"/>
           </a:p>
@@ -4466,7 +4466,7 @@
           <a:p>
             <a:fld id="{EB0080F8-EA1C-491D-963C-2C881B2F918F}" type="datetimeFigureOut">
               <a:rPr lang="en-GB" smtClean="0"/>
-              <a:t>08/04/2022</a:t>
+              <a:t>28/04/2022</a:t>
             </a:fld>
             <a:endParaRPr lang="en-GB"/>
           </a:p>
@@ -4616,7 +4616,7 @@
           <a:p>
             <a:fld id="{EB0080F8-EA1C-491D-963C-2C881B2F918F}" type="datetimeFigureOut">
               <a:rPr lang="en-GB" smtClean="0"/>
-              <a:t>08/04/2022</a:t>
+              <a:t>28/04/2022</a:t>
             </a:fld>
             <a:endParaRPr lang="en-GB"/>
           </a:p>
@@ -6149,7 +6149,7 @@
           <a:p>
             <a:fld id="{EB0080F8-EA1C-491D-963C-2C881B2F918F}" type="datetimeFigureOut">
               <a:rPr lang="en-GB" smtClean="0"/>
-              <a:t>08/04/2022</a:t>
+              <a:t>28/04/2022</a:t>
             </a:fld>
             <a:endParaRPr lang="en-GB"/>
           </a:p>
@@ -9643,8 +9643,8 @@
         </p:nvSpPr>
         <p:spPr>
           <a:xfrm>
-            <a:off x="300446" y="2210662"/>
-            <a:ext cx="3367912" cy="3939540"/>
+            <a:off x="300445" y="1252639"/>
+            <a:ext cx="4448577" cy="5478423"/>
           </a:xfrm>
           <a:prstGeom prst="rect">
             <a:avLst/>
@@ -9655,6 +9655,100 @@
             <a:spAutoFit/>
           </a:bodyPr>
           <a:lstStyle/>
+          <a:p>
+            <a:r>
+              <a:rPr lang="en-GB" sz="2500" dirty="0">
+                <a:solidFill>
+                  <a:schemeClr val="tx2">
+                    <a:lumMod val="50000"/>
+                    <a:lumOff val="50000"/>
+                  </a:schemeClr>
+                </a:solidFill>
+              </a:rPr>
+              <a:t>\</a:t>
+            </a:r>
+            <a:r>
+              <a:rPr lang="en-GB" sz="2500" dirty="0" err="1">
+                <a:solidFill>
+                  <a:schemeClr val="tx2">
+                    <a:lumMod val="50000"/>
+                    <a:lumOff val="50000"/>
+                  </a:schemeClr>
+                </a:solidFill>
+              </a:rPr>
+              <a:t>usepackage</a:t>
+            </a:r>
+            <a:r>
+              <a:rPr lang="en-GB" sz="2500" dirty="0"/>
+              <a:t>{</a:t>
+            </a:r>
+            <a:r>
+              <a:rPr lang="en-GB" sz="2500" dirty="0" err="1">
+                <a:solidFill>
+                  <a:schemeClr val="tx2">
+                    <a:lumMod val="50000"/>
+                    <a:lumOff val="50000"/>
+                  </a:schemeClr>
+                </a:solidFill>
+              </a:rPr>
+              <a:t>graphicx</a:t>
+            </a:r>
+            <a:r>
+              <a:rPr lang="en-GB" sz="2500" dirty="0"/>
+              <a:t>}</a:t>
+            </a:r>
+          </a:p>
+          <a:p>
+            <a:endParaRPr lang="en-GB" sz="2500" dirty="0">
+              <a:solidFill>
+                <a:schemeClr val="tx2">
+                  <a:lumMod val="50000"/>
+                  <a:lumOff val="50000"/>
+                </a:schemeClr>
+              </a:solidFill>
+            </a:endParaRPr>
+          </a:p>
+          <a:p>
+            <a:r>
+              <a:rPr lang="en-GB" sz="2500" dirty="0">
+                <a:solidFill>
+                  <a:schemeClr val="tx2">
+                    <a:lumMod val="50000"/>
+                    <a:lumOff val="50000"/>
+                  </a:schemeClr>
+                </a:solidFill>
+              </a:rPr>
+              <a:t>\begin</a:t>
+            </a:r>
+            <a:r>
+              <a:rPr lang="en-GB" sz="2500" dirty="0"/>
+              <a:t>{</a:t>
+            </a:r>
+            <a:r>
+              <a:rPr lang="en-GB" sz="2500" dirty="0">
+                <a:solidFill>
+                  <a:schemeClr val="accent4">
+                    <a:lumMod val="75000"/>
+                  </a:schemeClr>
+                </a:solidFill>
+              </a:rPr>
+              <a:t>document</a:t>
+            </a:r>
+            <a:r>
+              <a:rPr lang="en-GB" sz="2500" dirty="0"/>
+              <a:t>}</a:t>
+            </a:r>
+          </a:p>
+          <a:p>
+            <a:endParaRPr lang="en-GB" sz="2500" dirty="0">
+              <a:solidFill>
+                <a:schemeClr val="tx2">
+                  <a:lumMod val="50000"/>
+                  <a:lumOff val="50000"/>
+                </a:schemeClr>
+              </a:solidFill>
+            </a:endParaRPr>
+          </a:p>
           <a:p>
             <a:r>
               <a:rPr lang="en-GB" sz="2500" dirty="0">

</xml_diff>

<commit_message>
Added Problem Sheet note
</commit_message>
<xml_diff>
--- a/Intro to Latex Slides.pptx
+++ b/Intro to Latex Slides.pptx
@@ -200,7 +200,7 @@
 <file path=ppt/revisionInfo.xml><?xml version="1.0" encoding="utf-8"?>
 <p1510:revInfo xmlns:a="http://schemas.openxmlformats.org/drawingml/2006/main" xmlns:r="http://schemas.openxmlformats.org/officeDocument/2006/relationships" xmlns:p1510="http://schemas.microsoft.com/office/powerpoint/2015/10/main">
   <p1510:revLst>
-    <p1510:client id="{4444CFD2-6B08-4F5E-830C-F73E3611A601}" v="1" dt="2024-03-27T15:41:09.880"/>
+    <p1510:client id="{961B416C-CA3E-48DD-A984-2479A7DE5978}" v="1" dt="2024-04-30T15:05:52.479"/>
   </p1510:revLst>
 </p1510:revInfo>
 </file>
@@ -691,6 +691,30 @@
     </pc:docChg>
   </pc:docChgLst>
   <pc:docChgLst>
+    <pc:chgData name="Cooling, Chris" userId="6dcf99c9-2ba5-410a-8445-0893a3d1421f" providerId="ADAL" clId="{961B416C-CA3E-48DD-A984-2479A7DE5978}"/>
+    <pc:docChg chg="modSld">
+      <pc:chgData name="Cooling, Chris" userId="6dcf99c9-2ba5-410a-8445-0893a3d1421f" providerId="ADAL" clId="{961B416C-CA3E-48DD-A984-2479A7DE5978}" dt="2024-04-30T15:05:52.479" v="0"/>
+      <pc:docMkLst>
+        <pc:docMk/>
+      </pc:docMkLst>
+      <pc:sldChg chg="addSp modSp">
+        <pc:chgData name="Cooling, Chris" userId="6dcf99c9-2ba5-410a-8445-0893a3d1421f" providerId="ADAL" clId="{961B416C-CA3E-48DD-A984-2479A7DE5978}" dt="2024-04-30T15:05:52.479" v="0"/>
+        <pc:sldMkLst>
+          <pc:docMk/>
+          <pc:sldMk cId="687175056" sldId="322"/>
+        </pc:sldMkLst>
+        <pc:spChg chg="add mod">
+          <ac:chgData name="Cooling, Chris" userId="6dcf99c9-2ba5-410a-8445-0893a3d1421f" providerId="ADAL" clId="{961B416C-CA3E-48DD-A984-2479A7DE5978}" dt="2024-04-30T15:05:52.479" v="0"/>
+          <ac:spMkLst>
+            <pc:docMk/>
+            <pc:sldMk cId="687175056" sldId="322"/>
+            <ac:spMk id="6" creationId="{D86C6FB8-7A1B-C355-5E09-83B2D69EDB44}"/>
+          </ac:spMkLst>
+        </pc:spChg>
+      </pc:sldChg>
+    </pc:docChg>
+  </pc:docChgLst>
+  <pc:docChgLst>
     <pc:chgData name="Cooling, Chris" userId="6dcf99c9-2ba5-410a-8445-0893a3d1421f" providerId="ADAL" clId="{70997B12-B8AB-47B2-9023-7A1D422D744B}"/>
     <pc:docChg chg="custSel modSld">
       <pc:chgData name="Cooling, Chris" userId="6dcf99c9-2ba5-410a-8445-0893a3d1421f" providerId="ADAL" clId="{70997B12-B8AB-47B2-9023-7A1D422D744B}" dt="2023-01-23T10:47:24.701" v="365" actId="20577"/>
@@ -1052,7 +1076,7 @@
           <a:p>
             <a:fld id="{88EB714B-C3CC-4216-88C1-02913905B1CF}" type="datetimeFigureOut">
               <a:rPr lang="en-GB" smtClean="0"/>
-              <a:t>27/03/2024</a:t>
+              <a:t>30/04/2024</a:t>
             </a:fld>
             <a:endParaRPr lang="en-GB"/>
           </a:p>
@@ -5649,7 +5673,7 @@
           <a:p>
             <a:fld id="{EB0080F8-EA1C-491D-963C-2C881B2F918F}" type="datetimeFigureOut">
               <a:rPr lang="en-GB" smtClean="0"/>
-              <a:t>27/03/2024</a:t>
+              <a:t>30/04/2024</a:t>
             </a:fld>
             <a:endParaRPr lang="en-GB"/>
           </a:p>
@@ -5799,7 +5823,7 @@
           <a:p>
             <a:fld id="{EB0080F8-EA1C-491D-963C-2C881B2F918F}" type="datetimeFigureOut">
               <a:rPr lang="en-GB" smtClean="0"/>
-              <a:t>27/03/2024</a:t>
+              <a:t>30/04/2024</a:t>
             </a:fld>
             <a:endParaRPr lang="en-GB"/>
           </a:p>
@@ -7332,7 +7356,7 @@
           <a:p>
             <a:fld id="{EB0080F8-EA1C-491D-963C-2C881B2F918F}" type="datetimeFigureOut">
               <a:rPr lang="en-GB" smtClean="0"/>
-              <a:t>27/03/2024</a:t>
+              <a:t>30/04/2024</a:t>
             </a:fld>
             <a:endParaRPr lang="en-GB"/>
           </a:p>
@@ -14610,6 +14634,45 @@
           </a:prstGeom>
         </p:spPr>
       </p:pic>
+      <p:sp>
+        <p:nvSpPr>
+          <p:cNvPr id="6" name="TextBox 5">
+            <a:extLst>
+              <a:ext uri="{FF2B5EF4-FFF2-40B4-BE49-F238E27FC236}">
+                <a16:creationId xmlns:a16="http://schemas.microsoft.com/office/drawing/2014/main" id="{D86C6FB8-7A1B-C355-5E09-83B2D69EDB44}"/>
+              </a:ext>
+            </a:extLst>
+          </p:cNvPr>
+          <p:cNvSpPr txBox="1"/>
+          <p:nvPr/>
+        </p:nvSpPr>
+        <p:spPr>
+          <a:xfrm>
+            <a:off x="7357241" y="6498021"/>
+            <a:ext cx="1697422" cy="369332"/>
+          </a:xfrm>
+          <a:prstGeom prst="rect">
+            <a:avLst/>
+          </a:prstGeom>
+          <a:noFill/>
+        </p:spPr>
+        <p:txBody>
+          <a:bodyPr wrap="square" rtlCol="0">
+            <a:spAutoFit/>
+          </a:bodyPr>
+          <a:lstStyle/>
+          <a:p>
+            <a:r>
+              <a:rPr lang="en-GB" dirty="0">
+                <a:solidFill>
+                  <a:schemeClr val="accent2"/>
+                </a:solidFill>
+              </a:rPr>
+              <a:t>Problem Sheet</a:t>
+            </a:r>
+          </a:p>
+        </p:txBody>
+      </p:sp>
     </p:spTree>
     <p:extLst>
       <p:ext uri="{BB962C8B-B14F-4D97-AF65-F5344CB8AC3E}">

</xml_diff>